<commit_message>
LS/Nemesis Tier List analysis, added champions from the rumble stage, added more fun facts
</commit_message>
<xml_diff>
--- a/Presentation1.pptx
+++ b/Presentation1.pptx
@@ -110,6 +110,11 @@
       </a:defRPr>
     </a:lvl9pPr>
   </p:defaultTextStyle>
+  <p:extLst>
+    <p:ext uri="{EFAFB233-063F-42B5-8137-9DF3F51BA10A}">
+      <p15:sldGuideLst xmlns:p15="http://schemas.microsoft.com/office/powerpoint/2012/main"/>
+    </p:ext>
+  </p:extLst>
 </p:presentation>
 </file>
 
@@ -244,7 +249,7 @@
           <a:p>
             <a:fld id="{3D988361-7BB3-4BA8-A376-3676EBD55983}" type="datetimeFigureOut">
               <a:rPr lang="en-CA" smtClean="0"/>
-              <a:t>2021-05-14</a:t>
+              <a:t>2021-05-15</a:t>
             </a:fld>
             <a:endParaRPr lang="en-CA"/>
           </a:p>
@@ -414,7 +419,7 @@
           <a:p>
             <a:fld id="{3D988361-7BB3-4BA8-A376-3676EBD55983}" type="datetimeFigureOut">
               <a:rPr lang="en-CA" smtClean="0"/>
-              <a:t>2021-05-14</a:t>
+              <a:t>2021-05-15</a:t>
             </a:fld>
             <a:endParaRPr lang="en-CA"/>
           </a:p>
@@ -594,7 +599,7 @@
           <a:p>
             <a:fld id="{3D988361-7BB3-4BA8-A376-3676EBD55983}" type="datetimeFigureOut">
               <a:rPr lang="en-CA" smtClean="0"/>
-              <a:t>2021-05-14</a:t>
+              <a:t>2021-05-15</a:t>
             </a:fld>
             <a:endParaRPr lang="en-CA"/>
           </a:p>
@@ -764,7 +769,7 @@
           <a:p>
             <a:fld id="{3D988361-7BB3-4BA8-A376-3676EBD55983}" type="datetimeFigureOut">
               <a:rPr lang="en-CA" smtClean="0"/>
-              <a:t>2021-05-14</a:t>
+              <a:t>2021-05-15</a:t>
             </a:fld>
             <a:endParaRPr lang="en-CA"/>
           </a:p>
@@ -1010,7 +1015,7 @@
           <a:p>
             <a:fld id="{3D988361-7BB3-4BA8-A376-3676EBD55983}" type="datetimeFigureOut">
               <a:rPr lang="en-CA" smtClean="0"/>
-              <a:t>2021-05-14</a:t>
+              <a:t>2021-05-15</a:t>
             </a:fld>
             <a:endParaRPr lang="en-CA"/>
           </a:p>
@@ -1242,7 +1247,7 @@
           <a:p>
             <a:fld id="{3D988361-7BB3-4BA8-A376-3676EBD55983}" type="datetimeFigureOut">
               <a:rPr lang="en-CA" smtClean="0"/>
-              <a:t>2021-05-14</a:t>
+              <a:t>2021-05-15</a:t>
             </a:fld>
             <a:endParaRPr lang="en-CA"/>
           </a:p>
@@ -1609,7 +1614,7 @@
           <a:p>
             <a:fld id="{3D988361-7BB3-4BA8-A376-3676EBD55983}" type="datetimeFigureOut">
               <a:rPr lang="en-CA" smtClean="0"/>
-              <a:t>2021-05-14</a:t>
+              <a:t>2021-05-15</a:t>
             </a:fld>
             <a:endParaRPr lang="en-CA"/>
           </a:p>
@@ -1727,7 +1732,7 @@
           <a:p>
             <a:fld id="{3D988361-7BB3-4BA8-A376-3676EBD55983}" type="datetimeFigureOut">
               <a:rPr lang="en-CA" smtClean="0"/>
-              <a:t>2021-05-14</a:t>
+              <a:t>2021-05-15</a:t>
             </a:fld>
             <a:endParaRPr lang="en-CA"/>
           </a:p>
@@ -1822,7 +1827,7 @@
           <a:p>
             <a:fld id="{3D988361-7BB3-4BA8-A376-3676EBD55983}" type="datetimeFigureOut">
               <a:rPr lang="en-CA" smtClean="0"/>
-              <a:t>2021-05-14</a:t>
+              <a:t>2021-05-15</a:t>
             </a:fld>
             <a:endParaRPr lang="en-CA"/>
           </a:p>
@@ -2099,7 +2104,7 @@
           <a:p>
             <a:fld id="{3D988361-7BB3-4BA8-A376-3676EBD55983}" type="datetimeFigureOut">
               <a:rPr lang="en-CA" smtClean="0"/>
-              <a:t>2021-05-14</a:t>
+              <a:t>2021-05-15</a:t>
             </a:fld>
             <a:endParaRPr lang="en-CA"/>
           </a:p>
@@ -2356,7 +2361,7 @@
           <a:p>
             <a:fld id="{3D988361-7BB3-4BA8-A376-3676EBD55983}" type="datetimeFigureOut">
               <a:rPr lang="en-CA" smtClean="0"/>
-              <a:t>2021-05-14</a:t>
+              <a:t>2021-05-15</a:t>
             </a:fld>
             <a:endParaRPr lang="en-CA"/>
           </a:p>
@@ -2569,7 +2574,7 @@
           <a:p>
             <a:fld id="{3D988361-7BB3-4BA8-A376-3676EBD55983}" type="datetimeFigureOut">
               <a:rPr lang="en-CA" smtClean="0"/>
-              <a:t>2021-05-14</a:t>
+              <a:t>2021-05-15</a:t>
             </a:fld>
             <a:endParaRPr lang="en-CA"/>
           </a:p>
@@ -3081,8 +3086,8 @@
           </a:p>
         </p:txBody>
       </p:sp>
-      <mc:AlternateContent xmlns:mc="http://schemas.openxmlformats.org/markup-compatibility/2006">
-        <mc:Choice xmlns:a14="http://schemas.microsoft.com/office/drawing/2010/main" Requires="a14">
+      <mc:AlternateContent xmlns:mc="http://schemas.openxmlformats.org/markup-compatibility/2006" xmlns:a14="http://schemas.microsoft.com/office/drawing/2010/main">
+        <mc:Choice Requires="a14">
           <p:sp>
             <p:nvSpPr>
               <p:cNvPr id="6" name="TextBox 5">
@@ -3369,7 +3374,7 @@
             </p:txBody>
           </p:sp>
         </mc:Choice>
-        <mc:Fallback>
+        <mc:Fallback xmlns="">
           <p:sp>
             <p:nvSpPr>
               <p:cNvPr id="6" name="TextBox 5">
@@ -3414,8 +3419,8 @@
           </p:sp>
         </mc:Fallback>
       </mc:AlternateContent>
-      <mc:AlternateContent xmlns:mc="http://schemas.openxmlformats.org/markup-compatibility/2006">
-        <mc:Choice xmlns:a14="http://schemas.microsoft.com/office/drawing/2010/main" Requires="a14">
+      <mc:AlternateContent xmlns:mc="http://schemas.openxmlformats.org/markup-compatibility/2006" xmlns:a14="http://schemas.microsoft.com/office/drawing/2010/main">
+        <mc:Choice Requires="a14">
           <p:sp>
             <p:nvSpPr>
               <p:cNvPr id="8" name="TextBox 7">
@@ -3454,6 +3459,7 @@
                 </a:endParaRPr>
               </a:p>
               <a:p>
+                <a:pPr/>
                 <a14:m>
                   <m:oMathPara xmlns:m="http://schemas.openxmlformats.org/officeDocument/2006/math">
                     <m:oMathParaPr>
@@ -3619,6 +3625,7 @@
                 </a:endParaRPr>
               </a:p>
               <a:p>
+                <a:pPr/>
                 <a14:m>
                   <m:oMathPara xmlns:m="http://schemas.openxmlformats.org/officeDocument/2006/math">
                     <m:oMathParaPr>
@@ -3728,6 +3735,7 @@
                 </a:endParaRPr>
               </a:p>
               <a:p>
+                <a:pPr/>
                 <a14:m>
                   <m:oMathPara xmlns:m="http://schemas.openxmlformats.org/officeDocument/2006/math">
                     <m:oMathParaPr>
@@ -3899,7 +3907,7 @@
             </p:txBody>
           </p:sp>
         </mc:Choice>
-        <mc:Fallback>
+        <mc:Fallback xmlns="">
           <p:sp>
             <p:nvSpPr>
               <p:cNvPr id="8" name="TextBox 7">
@@ -4041,10 +4049,10 @@
       </p:grpSpPr>
       <p:pic>
         <p:nvPicPr>
-          <p:cNvPr id="2" name="Picture 1" descr="Chart&#10;&#10;Description automatically generated">
+          <p:cNvPr id="4" name="Picture 3" descr="Chart, bar chart&#10;&#10;Description automatically generated">
             <a:extLst>
               <a:ext uri="{FF2B5EF4-FFF2-40B4-BE49-F238E27FC236}">
-                <a16:creationId xmlns:a16="http://schemas.microsoft.com/office/drawing/2014/main" id="{3EE1AFCB-08FA-4DB9-AB41-977F1F64C058}"/>
+                <a16:creationId xmlns:a16="http://schemas.microsoft.com/office/drawing/2014/main" id="{BBCA25CC-EF4F-490F-A73F-D1DAF6F02BEF}"/>
               </a:ext>
             </a:extLst>
           </p:cNvPr>
@@ -4061,13 +4069,13 @@
               </a:ext>
             </a:extLst>
           </a:blip>
-          <a:srcRect l="10775" t="8824" r="9928"/>
+          <a:srcRect l="10295" t="9173" r="9920"/>
           <a:stretch/>
         </p:blipFill>
         <p:spPr>
           <a:xfrm>
-            <a:off x="0" y="973892"/>
-            <a:ext cx="6111551" cy="4344727"/>
+            <a:off x="6111550" y="973892"/>
+            <a:ext cx="6080449" cy="4344727"/>
           </a:xfrm>
           <a:prstGeom prst="rect">
             <a:avLst/>
@@ -4076,10 +4084,10 @@
       </p:pic>
       <p:pic>
         <p:nvPicPr>
-          <p:cNvPr id="4" name="Picture 3" descr="Chart, bar chart&#10;&#10;Description automatically generated">
+          <p:cNvPr id="5" name="Picture 4" descr="Chart&#10;&#10;Description automatically generated">
             <a:extLst>
               <a:ext uri="{FF2B5EF4-FFF2-40B4-BE49-F238E27FC236}">
-                <a16:creationId xmlns:a16="http://schemas.microsoft.com/office/drawing/2014/main" id="{BBCA25CC-EF4F-490F-A73F-D1DAF6F02BEF}"/>
+                <a16:creationId xmlns:a16="http://schemas.microsoft.com/office/drawing/2014/main" id="{325F5959-2D2A-4BA2-82AC-FF54D9FBCC5D}"/>
               </a:ext>
             </a:extLst>
           </p:cNvPr>
@@ -4096,13 +4104,13 @@
               </a:ext>
             </a:extLst>
           </a:blip>
-          <a:srcRect l="10295" t="9173" r="9920"/>
+          <a:srcRect l="10484" t="9173" r="10001"/>
           <a:stretch/>
         </p:blipFill>
         <p:spPr>
           <a:xfrm>
-            <a:off x="6111550" y="973892"/>
-            <a:ext cx="6080449" cy="4344727"/>
+            <a:off x="1" y="973892"/>
+            <a:ext cx="6111550" cy="4344727"/>
           </a:xfrm>
           <a:prstGeom prst="rect">
             <a:avLst/>
@@ -4207,10 +4215,10 @@
       </p:grpSpPr>
       <p:pic>
         <p:nvPicPr>
-          <p:cNvPr id="3" name="Picture 2" descr="Chart&#10;&#10;Description automatically generated">
+          <p:cNvPr id="4" name="Picture 3" descr="Chart&#10;&#10;Description automatically generated">
             <a:extLst>
               <a:ext uri="{FF2B5EF4-FFF2-40B4-BE49-F238E27FC236}">
-                <a16:creationId xmlns:a16="http://schemas.microsoft.com/office/drawing/2014/main" id="{5752CD59-A460-4A35-BEC5-DA853096B357}"/>
+                <a16:creationId xmlns:a16="http://schemas.microsoft.com/office/drawing/2014/main" id="{39AC5408-E2FF-4917-860E-B00836C015ED}"/>
               </a:ext>
             </a:extLst>
           </p:cNvPr>

</xml_diff>